<commit_message>
Last spell checking changes
</commit_message>
<xml_diff>
--- a/Slides/Escali-Slides.pptx
+++ b/Slides/Escali-Slides.pptx
@@ -263,7 +263,7 @@
           <a:p>
             <a:fld id="{D47D8A5B-AC4C-43B8-8900-F35950A2270E}" type="datetimeFigureOut">
               <a:rPr lang="de-DE" smtClean="0"/>
-              <a:t>06.02.2017</a:t>
+              <a:t>08.02.2017</a:t>
             </a:fld>
             <a:endParaRPr lang="de-DE"/>
           </a:p>
@@ -5194,11 +5194,7 @@
           <a:p>
             <a:r>
               <a:rPr lang="de-DE" dirty="0" err="1" smtClean="0"/>
-              <a:t>Schematro</a:t>
-            </a:r>
-            <a:r>
-              <a:rPr lang="de-DE" dirty="0" err="1" smtClean="0"/>
-              <a:t>n</a:t>
+              <a:t>Schematron</a:t>
             </a:r>
             <a:r>
               <a:rPr lang="de-DE" dirty="0" smtClean="0"/>
@@ -5361,11 +5357,7 @@
             </a:r>
             <a:r>
               <a:rPr lang="de-DE" dirty="0" err="1" smtClean="0"/>
-              <a:t>the</a:t>
-            </a:r>
-            <a:r>
-              <a:rPr lang="de-DE" dirty="0" err="1" smtClean="0"/>
-              <a:t>re</a:t>
+              <a:t>there</a:t>
             </a:r>
             <a:r>
               <a:rPr lang="de-DE" dirty="0" smtClean="0"/>
@@ -6817,7 +6809,13 @@
               <a:rPr lang="en-US" dirty="0" smtClean="0">
                 <a:sym typeface="Wingdings" panose="05000000000000000000" pitchFamily="2" charset="2"/>
               </a:rPr>
-              <a:t>Ignore logic</a:t>
+              <a:t>Ignore </a:t>
+            </a:r>
+            <a:r>
+              <a:rPr lang="en-US" dirty="0" smtClean="0">
+                <a:sym typeface="Wingdings" panose="05000000000000000000" pitchFamily="2" charset="2"/>
+              </a:rPr>
+              <a:t>Logic</a:t>
             </a:r>
             <a:endParaRPr lang="en-US" dirty="0">
               <a:sym typeface="Wingdings" panose="05000000000000000000" pitchFamily="2" charset="2"/>
@@ -6876,8 +6874,17 @@
             </a:r>
             <a:r>
               <a:rPr lang="de-DE" dirty="0" smtClean="0"/>
-              <a:t> check:</a:t>
-            </a:r>
+              <a:t> </a:t>
+            </a:r>
+            <a:r>
+              <a:rPr lang="de-DE" dirty="0" err="1" smtClean="0"/>
+              <a:t>test</a:t>
+            </a:r>
+            <a:r>
+              <a:rPr lang="de-DE" dirty="0" smtClean="0"/>
+              <a:t>:</a:t>
+            </a:r>
+            <a:endParaRPr lang="de-DE" dirty="0" smtClean="0"/>
           </a:p>
           <a:p>
             <a:endParaRPr lang="de-DE" dirty="0"/>
@@ -6887,8 +6894,12 @@
           </a:p>
           <a:p>
             <a:r>
-              <a:rPr lang="de-DE" dirty="0" smtClean="0"/>
-              <a:t>Every </a:t>
+              <a:rPr lang="de-DE" dirty="0" err="1" smtClean="0"/>
+              <a:t>Each</a:t>
+            </a:r>
+            <a:r>
+              <a:rPr lang="de-DE" dirty="0" smtClean="0"/>
+              <a:t> </a:t>
             </a:r>
             <a:r>
               <a:rPr lang="de-DE" dirty="0" err="1" smtClean="0"/>
@@ -6963,7 +6974,7 @@
             </a:r>
             <a:r>
               <a:rPr lang="de-DE" dirty="0" err="1" smtClean="0"/>
-              <a:t>automaticaly</a:t>
+              <a:t>automatically</a:t>
             </a:r>
             <a:r>
               <a:rPr lang="de-DE" dirty="0" smtClean="0"/>
@@ -7654,24 +7665,106 @@
               <a:rPr lang="de-DE" dirty="0" smtClean="0"/>
               <a:t> </a:t>
             </a:r>
+          </a:p>
+          <a:p>
+            <a:r>
+              <a:rPr lang="de-DE" dirty="0" smtClean="0"/>
+              <a:t>Pattern </a:t>
+            </a:r>
+            <a:r>
+              <a:rPr lang="de-DE" dirty="0" err="1" smtClean="0"/>
+              <a:t>matching</a:t>
+            </a:r>
             <a:endParaRPr lang="de-DE" dirty="0" smtClean="0"/>
           </a:p>
           <a:p>
-            <a:r>
-              <a:rPr lang="de-DE" dirty="0" smtClean="0"/>
-              <a:t>Pattern </a:t>
-            </a:r>
-            <a:r>
-              <a:rPr lang="de-DE" dirty="0" err="1" smtClean="0"/>
-              <a:t>matching</a:t>
+            <a:pPr lvl="1"/>
+            <a:r>
+              <a:rPr lang="de-DE" dirty="0" err="1" smtClean="0"/>
+              <a:t>Use</a:t>
+            </a:r>
+            <a:r>
+              <a:rPr lang="de-DE" dirty="0" smtClean="0"/>
+              <a:t> </a:t>
+            </a:r>
+            <a:r>
+              <a:rPr lang="de-DE" dirty="0" err="1" smtClean="0"/>
+              <a:t>case</a:t>
+            </a:r>
+            <a:r>
+              <a:rPr lang="de-DE" dirty="0" smtClean="0"/>
+              <a:t>: </a:t>
+            </a:r>
+            <a:r>
+              <a:rPr lang="de-DE" dirty="0" err="1" smtClean="0"/>
+              <a:t>If</a:t>
+            </a:r>
+            <a:r>
+              <a:rPr lang="de-DE" dirty="0" smtClean="0"/>
+              <a:t> multiple </a:t>
+            </a:r>
+            <a:r>
+              <a:rPr lang="de-DE" dirty="0" err="1" smtClean="0"/>
+              <a:t>rules</a:t>
+            </a:r>
+            <a:r>
+              <a:rPr lang="de-DE" dirty="0" smtClean="0"/>
+              <a:t> </a:t>
+            </a:r>
+            <a:r>
+              <a:rPr lang="de-DE" dirty="0" err="1" smtClean="0"/>
+              <a:t>match</a:t>
+            </a:r>
+            <a:r>
+              <a:rPr lang="de-DE" dirty="0" smtClean="0"/>
+              <a:t> </a:t>
+            </a:r>
+            <a:r>
+              <a:rPr lang="de-DE" dirty="0" err="1" smtClean="0"/>
+              <a:t>to</a:t>
+            </a:r>
+            <a:r>
+              <a:rPr lang="de-DE" dirty="0" smtClean="0"/>
+              <a:t> </a:t>
+            </a:r>
+            <a:r>
+              <a:rPr lang="de-DE" dirty="0" err="1" smtClean="0"/>
+              <a:t>the</a:t>
+            </a:r>
+            <a:r>
+              <a:rPr lang="de-DE" dirty="0" smtClean="0"/>
+              <a:t> same </a:t>
+            </a:r>
+            <a:r>
+              <a:rPr lang="de-DE" dirty="0" err="1" smtClean="0"/>
+              <a:t>node</a:t>
             </a:r>
             <a:endParaRPr lang="de-DE" dirty="0" smtClean="0"/>
           </a:p>
           <a:p>
+            <a:r>
+              <a:rPr lang="de-DE" dirty="0" err="1" smtClean="0"/>
+              <a:t>Phases</a:t>
+            </a:r>
+            <a:endParaRPr lang="de-DE" dirty="0" smtClean="0"/>
+          </a:p>
+          <a:p>
             <a:pPr lvl="1"/>
             <a:r>
-              <a:rPr lang="de-DE" dirty="0" err="1" smtClean="0"/>
-              <a:t>Use</a:t>
+              <a:rPr lang="de-DE" dirty="0" smtClean="0"/>
+              <a:t>Reuse </a:t>
+            </a:r>
+            <a:r>
+              <a:rPr lang="de-DE" dirty="0" err="1" smtClean="0"/>
+              <a:t>phases</a:t>
+            </a:r>
+            <a:r>
+              <a:rPr lang="de-DE" dirty="0" smtClean="0"/>
+              <a:t>, </a:t>
+            </a:r>
+            <a:r>
+              <a:rPr lang="de-DE" dirty="0" err="1" smtClean="0"/>
+              <a:t>make</a:t>
             </a:r>
             <a:r>
               <a:rPr lang="de-DE" dirty="0" smtClean="0"/>
@@ -7679,23 +7772,7 @@
             </a:r>
             <a:r>
               <a:rPr lang="de-DE" dirty="0" err="1" smtClean="0"/>
-              <a:t>case</a:t>
-            </a:r>
-            <a:r>
-              <a:rPr lang="de-DE" dirty="0" smtClean="0"/>
-              <a:t>: </a:t>
-            </a:r>
-            <a:r>
-              <a:rPr lang="de-DE" dirty="0" err="1" smtClean="0"/>
-              <a:t>If</a:t>
-            </a:r>
-            <a:r>
-              <a:rPr lang="de-DE" dirty="0" smtClean="0"/>
-              <a:t> multiple </a:t>
-            </a:r>
-            <a:r>
-              <a:rPr lang="de-DE" dirty="0" err="1" smtClean="0"/>
-              <a:t>rules</a:t>
+              <a:t>patterns</a:t>
             </a:r>
             <a:r>
               <a:rPr lang="de-DE" dirty="0" smtClean="0"/>
@@ -7703,74 +7780,7 @@
             </a:r>
             <a:r>
               <a:rPr lang="de-DE" dirty="0" err="1" smtClean="0"/>
-              <a:t>match</a:t>
-            </a:r>
-            <a:r>
-              <a:rPr lang="de-DE" dirty="0" smtClean="0"/>
-              <a:t> </a:t>
-            </a:r>
-            <a:r>
-              <a:rPr lang="de-DE" dirty="0" err="1" smtClean="0"/>
-              <a:t>to</a:t>
-            </a:r>
-            <a:r>
-              <a:rPr lang="de-DE" dirty="0" smtClean="0"/>
-              <a:t> </a:t>
-            </a:r>
-            <a:r>
-              <a:rPr lang="de-DE" dirty="0" err="1" smtClean="0"/>
-              <a:t>the</a:t>
-            </a:r>
-            <a:r>
-              <a:rPr lang="de-DE" dirty="0" smtClean="0"/>
-              <a:t> same </a:t>
-            </a:r>
-            <a:r>
-              <a:rPr lang="de-DE" dirty="0" err="1" smtClean="0"/>
-              <a:t>node</a:t>
-            </a:r>
-            <a:endParaRPr lang="de-DE" dirty="0" smtClean="0"/>
-          </a:p>
-          <a:p>
-            <a:r>
-              <a:rPr lang="de-DE" dirty="0" err="1" smtClean="0"/>
-              <a:t>Phases</a:t>
-            </a:r>
-            <a:endParaRPr lang="de-DE" dirty="0" smtClean="0"/>
-          </a:p>
-          <a:p>
-            <a:pPr lvl="1"/>
-            <a:r>
-              <a:rPr lang="de-DE" dirty="0" smtClean="0"/>
-              <a:t>Reuse </a:t>
-            </a:r>
-            <a:r>
-              <a:rPr lang="de-DE" dirty="0" err="1" smtClean="0"/>
-              <a:t>phases</a:t>
-            </a:r>
-            <a:r>
-              <a:rPr lang="de-DE" dirty="0" smtClean="0"/>
-              <a:t>, </a:t>
-            </a:r>
-            <a:r>
-              <a:rPr lang="de-DE" dirty="0" err="1" smtClean="0"/>
-              <a:t>make</a:t>
-            </a:r>
-            <a:r>
-              <a:rPr lang="de-DE" dirty="0" smtClean="0"/>
-              <a:t> </a:t>
-            </a:r>
-            <a:r>
-              <a:rPr lang="de-DE" dirty="0" err="1" smtClean="0"/>
-              <a:t>patterns</a:t>
-            </a:r>
-            <a:r>
-              <a:rPr lang="de-DE" dirty="0" smtClean="0"/>
-              <a:t> </a:t>
-            </a:r>
-            <a:r>
-              <a:rPr lang="de-DE" dirty="0" err="1" smtClean="0"/>
-              <a:t>allways</a:t>
+              <a:t>always</a:t>
             </a:r>
             <a:r>
               <a:rPr lang="de-DE" dirty="0" smtClean="0"/>

</xml_diff>